<commit_message>
fix typo in schema and update powerpoint
</commit_message>
<xml_diff>
--- a/Documents/HL7_KNART_MSY_Jan2018.pptx
+++ b/Documents/HL7_KNART_MSY_Jan2018.pptx
@@ -5,7 +5,7 @@
     <p:sldMasterId id="2147483674" r:id="rId1"/>
   </p:sldMasterIdLst>
   <p:notesMasterIdLst>
-    <p:notesMasterId r:id="rId11"/>
+    <p:notesMasterId r:id="rId18"/>
   </p:notesMasterIdLst>
   <p:sldIdLst>
     <p:sldId id="256" r:id="rId2"/>
@@ -13,10 +13,17 @@
     <p:sldId id="274" r:id="rId4"/>
     <p:sldId id="273" r:id="rId5"/>
     <p:sldId id="283" r:id="rId6"/>
-    <p:sldId id="282" r:id="rId7"/>
-    <p:sldId id="284" r:id="rId8"/>
-    <p:sldId id="285" r:id="rId9"/>
-    <p:sldId id="281" r:id="rId10"/>
+    <p:sldId id="286" r:id="rId7"/>
+    <p:sldId id="289" r:id="rId8"/>
+    <p:sldId id="290" r:id="rId9"/>
+    <p:sldId id="287" r:id="rId10"/>
+    <p:sldId id="291" r:id="rId11"/>
+    <p:sldId id="282" r:id="rId12"/>
+    <p:sldId id="284" r:id="rId13"/>
+    <p:sldId id="292" r:id="rId14"/>
+    <p:sldId id="285" r:id="rId15"/>
+    <p:sldId id="288" r:id="rId16"/>
+    <p:sldId id="281" r:id="rId17"/>
   </p:sldIdLst>
   <p:sldSz cx="9144000" cy="6858000" type="screen4x3"/>
   <p:notesSz cx="6858000" cy="9144000"/>
@@ -200,7 +207,7 @@
           <a:p>
             <a:fld id="{54AC124F-0A4C-6841-BD40-BD4BBC7153E8}" type="datetimeFigureOut">
               <a:rPr lang="en-US" smtClean="0"/>
-              <a:t>18-01-24</a:t>
+              <a:t>18-01-27</a:t>
             </a:fld>
             <a:endParaRPr lang="en-US"/>
           </a:p>
@@ -785,7 +792,7 @@
           <a:p>
             <a:fld id="{5D9046F8-648A-0845-9DCE-E935B319EE46}" type="slidenum">
               <a:rPr lang="en-US" smtClean="0"/>
-              <a:t>9</a:t>
+              <a:t>16</a:t>
             </a:fld>
             <a:endParaRPr lang="en-US"/>
           </a:p>
@@ -1380,7 +1387,7 @@
           <a:p>
             <a:fld id="{713367F0-BA6F-BF42-B927-7596F96B2E73}" type="datetimeFigureOut">
               <a:rPr lang="en-US" smtClean="0"/>
-              <a:t>18-01-24</a:t>
+              <a:t>18-01-27</a:t>
             </a:fld>
             <a:endParaRPr lang="en-US"/>
           </a:p>
@@ -1579,7 +1586,7 @@
           <a:p>
             <a:fld id="{713367F0-BA6F-BF42-B927-7596F96B2E73}" type="datetimeFigureOut">
               <a:rPr lang="en-US" smtClean="0"/>
-              <a:t>18-01-24</a:t>
+              <a:t>18-01-27</a:t>
             </a:fld>
             <a:endParaRPr lang="en-US"/>
           </a:p>
@@ -1693,7 +1700,7 @@
           <a:p>
             <a:fld id="{713367F0-BA6F-BF42-B927-7596F96B2E73}" type="datetimeFigureOut">
               <a:rPr lang="en-US" smtClean="0"/>
-              <a:t>18-01-24</a:t>
+              <a:t>18-01-27</a:t>
             </a:fld>
             <a:endParaRPr lang="en-US"/>
           </a:p>
@@ -1888,7 +1895,7 @@
           <a:p>
             <a:fld id="{2592FCAB-1F6C-2542-9D00-D7424E1FAF13}" type="datetimeFigureOut">
               <a:rPr lang="en-US" smtClean="0"/>
-              <a:t>18-01-24</a:t>
+              <a:t>18-01-27</a:t>
             </a:fld>
             <a:endParaRPr lang="en-US"/>
           </a:p>
@@ -2765,7 +2772,7 @@
           <a:p>
             <a:fld id="{713367F0-BA6F-BF42-B927-7596F96B2E73}" type="datetimeFigureOut">
               <a:rPr lang="en-US" smtClean="0"/>
-              <a:t>18-01-24</a:t>
+              <a:t>18-01-27</a:t>
             </a:fld>
             <a:endParaRPr lang="en-US"/>
           </a:p>
@@ -3277,7 +3284,7 @@
           <a:p>
             <a:fld id="{713367F0-BA6F-BF42-B927-7596F96B2E73}" type="datetimeFigureOut">
               <a:rPr lang="en-US" smtClean="0"/>
-              <a:t>18-01-24</a:t>
+              <a:t>18-01-27</a:t>
             </a:fld>
             <a:endParaRPr lang="en-US"/>
           </a:p>
@@ -3414,7 +3421,7 @@
           <a:p>
             <a:fld id="{713367F0-BA6F-BF42-B927-7596F96B2E73}" type="datetimeFigureOut">
               <a:rPr lang="en-US" smtClean="0"/>
-              <a:t>18-01-24</a:t>
+              <a:t>18-01-27</a:t>
             </a:fld>
             <a:endParaRPr lang="en-US"/>
           </a:p>
@@ -3528,7 +3535,7 @@
           <a:p>
             <a:fld id="{713367F0-BA6F-BF42-B927-7596F96B2E73}" type="datetimeFigureOut">
               <a:rPr lang="en-US" smtClean="0"/>
-              <a:t>18-01-24</a:t>
+              <a:t>18-01-27</a:t>
             </a:fld>
             <a:endParaRPr lang="en-US"/>
           </a:p>
@@ -3982,7 +3989,7 @@
           <a:p>
             <a:fld id="{713367F0-BA6F-BF42-B927-7596F96B2E73}" type="datetimeFigureOut">
               <a:rPr lang="en-US" smtClean="0"/>
-              <a:t>18-01-24</a:t>
+              <a:t>18-01-27</a:t>
             </a:fld>
             <a:endParaRPr lang="en-US"/>
           </a:p>
@@ -4538,7 +4545,7 @@
           <a:p>
             <a:fld id="{713367F0-BA6F-BF42-B927-7596F96B2E73}" type="datetimeFigureOut">
               <a:rPr lang="en-US" smtClean="0"/>
-              <a:t>18-01-24</a:t>
+              <a:t>18-01-27</a:t>
             </a:fld>
             <a:endParaRPr lang="en-US"/>
           </a:p>
@@ -5723,11 +5730,7 @@
           <a:p>
             <a:r>
               <a:rPr lang="en-US" dirty="0" smtClean="0"/>
-              <a:t>Hl7 Working group meeting, </a:t>
-            </a:r>
-            <a:r>
-              <a:rPr lang="en-US" dirty="0" smtClean="0"/>
-              <a:t>Jan 31</a:t>
+              <a:t>Hl7 Working group meeting, Jan 31</a:t>
             </a:r>
             <a:r>
               <a:rPr lang="en-US" baseline="30000" dirty="0" smtClean="0"/>
@@ -5745,6 +5748,846 @@
     <p:extLst>
       <p:ext uri="{BB962C8B-B14F-4D97-AF65-F5344CB8AC3E}">
         <p14:creationId xmlns:p14="http://schemas.microsoft.com/office/powerpoint/2010/main" val="3055156495"/>
+      </p:ext>
+    </p:extLst>
+  </p:cSld>
+  <p:clrMapOvr>
+    <a:masterClrMapping/>
+  </p:clrMapOvr>
+  <p:timing>
+    <p:tnLst>
+      <p:par>
+        <p:cTn xmlns:p14="http://schemas.microsoft.com/office/powerpoint/2010/main" id="1" dur="indefinite" restart="never" nodeType="tmRoot"/>
+      </p:par>
+    </p:tnLst>
+  </p:timing>
+</p:sld>
+</file>
+
+<file path=ppt/slides/slide10.xml><?xml version="1.0" encoding="utf-8"?>
+<p:sld xmlns:a="http://schemas.openxmlformats.org/drawingml/2006/main" xmlns:r="http://schemas.openxmlformats.org/officeDocument/2006/relationships" xmlns:p="http://schemas.openxmlformats.org/presentationml/2006/main">
+  <p:cSld>
+    <p:spTree>
+      <p:nvGrpSpPr>
+        <p:cNvPr id="1" name=""/>
+        <p:cNvGrpSpPr/>
+        <p:nvPr/>
+      </p:nvGrpSpPr>
+      <p:grpSpPr>
+        <a:xfrm>
+          <a:off x="0" y="0"/>
+          <a:ext cx="0" cy="0"/>
+          <a:chOff x="0" y="0"/>
+          <a:chExt cx="0" cy="0"/>
+        </a:xfrm>
+      </p:grpSpPr>
+      <p:sp>
+        <p:nvSpPr>
+          <p:cNvPr id="2" name="Title 1"/>
+          <p:cNvSpPr>
+            <a:spLocks noGrp="1"/>
+          </p:cNvSpPr>
+          <p:nvPr>
+            <p:ph type="title"/>
+          </p:nvPr>
+        </p:nvSpPr>
+        <p:spPr/>
+        <p:txBody>
+          <a:bodyPr/>
+          <a:lstStyle/>
+          <a:p>
+            <a:r>
+              <a:rPr lang="en-US" dirty="0" smtClean="0"/>
+              <a:t>Plan definition</a:t>
+            </a:r>
+            <a:endParaRPr lang="en-US" dirty="0"/>
+          </a:p>
+        </p:txBody>
+      </p:sp>
+      <p:sp>
+        <p:nvSpPr>
+          <p:cNvPr id="3" name="Text Placeholder 2"/>
+          <p:cNvSpPr>
+            <a:spLocks noGrp="1"/>
+          </p:cNvSpPr>
+          <p:nvPr>
+            <p:ph type="body" idx="1"/>
+          </p:nvPr>
+        </p:nvSpPr>
+        <p:spPr/>
+        <p:txBody>
+          <a:bodyPr/>
+          <a:lstStyle/>
+          <a:p>
+            <a:endParaRPr lang="en-US" dirty="0"/>
+          </a:p>
+        </p:txBody>
+      </p:sp>
+      <p:pic>
+        <p:nvPicPr>
+          <p:cNvPr id="4" name="Picture 3" descr="Plan Definition.jpg"/>
+          <p:cNvPicPr>
+            <a:picLocks noChangeAspect="1"/>
+          </p:cNvPicPr>
+          <p:nvPr/>
+        </p:nvPicPr>
+        <p:blipFill>
+          <a:blip r:embed="rId2">
+            <a:extLst>
+              <a:ext uri="{28A0092B-C50C-407E-A947-70E740481C1C}">
+                <a14:useLocalDpi xmlns:a14="http://schemas.microsoft.com/office/drawing/2010/main" val="0"/>
+              </a:ext>
+            </a:extLst>
+          </a:blip>
+          <a:stretch>
+            <a:fillRect/>
+          </a:stretch>
+        </p:blipFill>
+        <p:spPr>
+          <a:xfrm>
+            <a:off x="822960" y="914400"/>
+            <a:ext cx="7071080" cy="5737158"/>
+          </a:xfrm>
+          <a:prstGeom prst="rect">
+            <a:avLst/>
+          </a:prstGeom>
+        </p:spPr>
+      </p:pic>
+    </p:spTree>
+    <p:extLst>
+      <p:ext uri="{BB962C8B-B14F-4D97-AF65-F5344CB8AC3E}">
+        <p14:creationId xmlns:p14="http://schemas.microsoft.com/office/powerpoint/2010/main" val="2337254829"/>
+      </p:ext>
+    </p:extLst>
+  </p:cSld>
+  <p:clrMapOvr>
+    <a:masterClrMapping/>
+  </p:clrMapOvr>
+  <p:timing>
+    <p:tnLst>
+      <p:par>
+        <p:cTn xmlns:p14="http://schemas.microsoft.com/office/powerpoint/2010/main" id="1" dur="indefinite" restart="never" nodeType="tmRoot"/>
+      </p:par>
+    </p:tnLst>
+  </p:timing>
+</p:sld>
+</file>
+
+<file path=ppt/slides/slide11.xml><?xml version="1.0" encoding="utf-8"?>
+<p:sld xmlns:a="http://schemas.openxmlformats.org/drawingml/2006/main" xmlns:r="http://schemas.openxmlformats.org/officeDocument/2006/relationships" xmlns:p="http://schemas.openxmlformats.org/presentationml/2006/main">
+  <p:cSld>
+    <p:spTree>
+      <p:nvGrpSpPr>
+        <p:cNvPr id="1" name=""/>
+        <p:cNvGrpSpPr/>
+        <p:nvPr/>
+      </p:nvGrpSpPr>
+      <p:grpSpPr>
+        <a:xfrm>
+          <a:off x="0" y="0"/>
+          <a:ext cx="0" cy="0"/>
+          <a:chOff x="0" y="0"/>
+          <a:chExt cx="0" cy="0"/>
+        </a:xfrm>
+      </p:grpSpPr>
+      <p:sp>
+        <p:nvSpPr>
+          <p:cNvPr id="2" name="Title 1"/>
+          <p:cNvSpPr>
+            <a:spLocks noGrp="1"/>
+          </p:cNvSpPr>
+          <p:nvPr>
+            <p:ph type="title"/>
+          </p:nvPr>
+        </p:nvSpPr>
+        <p:spPr/>
+        <p:txBody>
+          <a:bodyPr/>
+          <a:lstStyle/>
+          <a:p>
+            <a:r>
+              <a:rPr lang="en-US" dirty="0" err="1" smtClean="0"/>
+              <a:t>Hed</a:t>
+            </a:r>
+            <a:r>
+              <a:rPr lang="en-US" baseline="0" dirty="0" smtClean="0"/>
+              <a:t> </a:t>
+            </a:r>
+            <a:r>
+              <a:rPr lang="en-US" baseline="0" dirty="0" err="1" smtClean="0"/>
+              <a:t>kas</a:t>
+            </a:r>
+            <a:endParaRPr lang="en-US" dirty="0"/>
+          </a:p>
+        </p:txBody>
+      </p:sp>
+      <p:sp>
+        <p:nvSpPr>
+          <p:cNvPr id="3" name="Text Placeholder 2"/>
+          <p:cNvSpPr>
+            <a:spLocks noGrp="1"/>
+          </p:cNvSpPr>
+          <p:nvPr>
+            <p:ph type="body" idx="1"/>
+          </p:nvPr>
+        </p:nvSpPr>
+        <p:spPr/>
+        <p:txBody>
+          <a:bodyPr/>
+          <a:lstStyle/>
+          <a:p>
+            <a:r>
+              <a:rPr lang="en-US" sz="2400" dirty="0" smtClean="0"/>
+              <a:t>34 STU comments in queue</a:t>
+            </a:r>
+          </a:p>
+          <a:p>
+            <a:pPr lvl="2"/>
+            <a:r>
+              <a:rPr lang="en-US" sz="2000" dirty="0" smtClean="0"/>
+              <a:t>8 will</a:t>
+            </a:r>
+            <a:r>
+              <a:rPr lang="en-US" sz="2000" baseline="0" dirty="0" smtClean="0"/>
+              <a:t> be addressed in the Conceptual Model work</a:t>
+            </a:r>
+          </a:p>
+          <a:p>
+            <a:pPr lvl="2"/>
+            <a:r>
+              <a:rPr lang="en-US" sz="2000" baseline="0" dirty="0" smtClean="0"/>
+              <a:t>11 are candidates for an errata or STU update</a:t>
+            </a:r>
+          </a:p>
+          <a:p>
+            <a:pPr lvl="2"/>
+            <a:r>
+              <a:rPr lang="en-US" sz="2000" baseline="0" dirty="0" smtClean="0"/>
+              <a:t>8 are feature requests for STU release 2, including support for composition</a:t>
+            </a:r>
+          </a:p>
+          <a:p>
+            <a:pPr lvl="2"/>
+            <a:r>
+              <a:rPr lang="en-US" sz="2000" dirty="0" smtClean="0"/>
+              <a:t>Remainder are new entries not reviewed yet</a:t>
+            </a:r>
+          </a:p>
+          <a:p>
+            <a:pPr lvl="2"/>
+            <a:endParaRPr lang="en-US" sz="2000" dirty="0"/>
+          </a:p>
+          <a:p>
+            <a:pPr lvl="1"/>
+            <a:r>
+              <a:rPr lang="en-US" b="1" dirty="0"/>
+              <a:t>STU Comment page:</a:t>
+            </a:r>
+          </a:p>
+          <a:p>
+            <a:pPr lvl="1"/>
+            <a:r>
+              <a:rPr lang="en-US" sz="2000" dirty="0"/>
+              <a:t>http://www.hl7.org/</a:t>
+            </a:r>
+            <a:r>
+              <a:rPr lang="en-US" sz="2000" dirty="0" err="1"/>
+              <a:t>dstucomments</a:t>
+            </a:r>
+            <a:r>
+              <a:rPr lang="en-US" sz="2000" dirty="0"/>
+              <a:t>/</a:t>
+            </a:r>
+            <a:r>
+              <a:rPr lang="en-US" sz="2000" dirty="0" err="1"/>
+              <a:t>showdetail.cfm?dstuid</a:t>
+            </a:r>
+            <a:r>
+              <a:rPr lang="en-US" sz="2000" dirty="0"/>
+              <a:t>=156</a:t>
+            </a:r>
+          </a:p>
+        </p:txBody>
+      </p:sp>
+    </p:spTree>
+    <p:extLst>
+      <p:ext uri="{BB962C8B-B14F-4D97-AF65-F5344CB8AC3E}">
+        <p14:creationId xmlns:p14="http://schemas.microsoft.com/office/powerpoint/2010/main" val="1969642456"/>
+      </p:ext>
+    </p:extLst>
+  </p:cSld>
+  <p:clrMapOvr>
+    <a:masterClrMapping/>
+  </p:clrMapOvr>
+  <p:timing>
+    <p:tnLst>
+      <p:par>
+        <p:cTn xmlns:p14="http://schemas.microsoft.com/office/powerpoint/2010/main" id="1" dur="indefinite" restart="never" nodeType="tmRoot"/>
+      </p:par>
+    </p:tnLst>
+  </p:timing>
+</p:sld>
+</file>
+
+<file path=ppt/slides/slide12.xml><?xml version="1.0" encoding="utf-8"?>
+<p:sld xmlns:a="http://schemas.openxmlformats.org/drawingml/2006/main" xmlns:r="http://schemas.openxmlformats.org/officeDocument/2006/relationships" xmlns:p="http://schemas.openxmlformats.org/presentationml/2006/main">
+  <p:cSld>
+    <p:spTree>
+      <p:nvGrpSpPr>
+        <p:cNvPr id="1" name=""/>
+        <p:cNvGrpSpPr/>
+        <p:nvPr/>
+      </p:nvGrpSpPr>
+      <p:grpSpPr>
+        <a:xfrm>
+          <a:off x="0" y="0"/>
+          <a:ext cx="0" cy="0"/>
+          <a:chOff x="0" y="0"/>
+          <a:chExt cx="0" cy="0"/>
+        </a:xfrm>
+      </p:grpSpPr>
+      <p:sp>
+        <p:nvSpPr>
+          <p:cNvPr id="2" name="Title 1"/>
+          <p:cNvSpPr>
+            <a:spLocks noGrp="1"/>
+          </p:cNvSpPr>
+          <p:nvPr>
+            <p:ph type="title"/>
+          </p:nvPr>
+        </p:nvSpPr>
+        <p:spPr/>
+        <p:txBody>
+          <a:bodyPr/>
+          <a:lstStyle/>
+          <a:p>
+            <a:r>
+              <a:rPr lang="en-US" dirty="0" smtClean="0"/>
+              <a:t>Composite </a:t>
+            </a:r>
+            <a:r>
+              <a:rPr lang="en-US" dirty="0" err="1" smtClean="0"/>
+              <a:t>knarts</a:t>
+            </a:r>
+            <a:endParaRPr lang="en-US" dirty="0"/>
+          </a:p>
+        </p:txBody>
+      </p:sp>
+      <p:sp>
+        <p:nvSpPr>
+          <p:cNvPr id="3" name="Text Placeholder 2"/>
+          <p:cNvSpPr>
+            <a:spLocks noGrp="1"/>
+          </p:cNvSpPr>
+          <p:nvPr>
+            <p:ph type="body" idx="1"/>
+          </p:nvPr>
+        </p:nvSpPr>
+        <p:spPr/>
+        <p:txBody>
+          <a:bodyPr/>
+          <a:lstStyle/>
+          <a:p>
+            <a:r>
+              <a:rPr lang="en-US" dirty="0" smtClean="0"/>
+              <a:t>Design principles</a:t>
+            </a:r>
+          </a:p>
+          <a:p>
+            <a:pPr lvl="3"/>
+            <a:r>
+              <a:rPr lang="en-US" dirty="0" smtClean="0"/>
+              <a:t>Singleton </a:t>
+            </a:r>
+            <a:r>
+              <a:rPr lang="en-US" dirty="0" err="1" smtClean="0"/>
+              <a:t>knarts</a:t>
+            </a:r>
+            <a:r>
+              <a:rPr lang="en-US" dirty="0" smtClean="0"/>
+              <a:t> as a standalone</a:t>
+            </a:r>
+            <a:r>
+              <a:rPr lang="en-US" baseline="0" dirty="0" smtClean="0"/>
+              <a:t> entity</a:t>
+            </a:r>
+          </a:p>
+          <a:p>
+            <a:pPr lvl="3"/>
+            <a:r>
+              <a:rPr lang="en-US" baseline="0" dirty="0" smtClean="0"/>
+              <a:t>Container model for composite, which handles the knowledge of structure, relationships and behavior</a:t>
+            </a:r>
+          </a:p>
+          <a:p>
+            <a:pPr lvl="3"/>
+            <a:r>
+              <a:rPr lang="en-US" baseline="0" dirty="0" smtClean="0"/>
+              <a:t>Metadata, intra-artifact referencing, context, orchestration, conceptual models of context activation</a:t>
+            </a:r>
+          </a:p>
+          <a:p>
+            <a:pPr lvl="3"/>
+            <a:endParaRPr lang="en-US" dirty="0" smtClean="0"/>
+          </a:p>
+        </p:txBody>
+      </p:sp>
+    </p:spTree>
+    <p:extLst>
+      <p:ext uri="{BB962C8B-B14F-4D97-AF65-F5344CB8AC3E}">
+        <p14:creationId xmlns:p14="http://schemas.microsoft.com/office/powerpoint/2010/main" val="1841712993"/>
+      </p:ext>
+    </p:extLst>
+  </p:cSld>
+  <p:clrMapOvr>
+    <a:masterClrMapping/>
+  </p:clrMapOvr>
+  <p:timing>
+    <p:tnLst>
+      <p:par>
+        <p:cTn xmlns:p14="http://schemas.microsoft.com/office/powerpoint/2010/main" id="1" dur="indefinite" restart="never" nodeType="tmRoot"/>
+      </p:par>
+    </p:tnLst>
+  </p:timing>
+</p:sld>
+</file>
+
+<file path=ppt/slides/slide13.xml><?xml version="1.0" encoding="utf-8"?>
+<p:sld xmlns:a="http://schemas.openxmlformats.org/drawingml/2006/main" xmlns:r="http://schemas.openxmlformats.org/officeDocument/2006/relationships" xmlns:p="http://schemas.openxmlformats.org/presentationml/2006/main">
+  <p:cSld>
+    <p:spTree>
+      <p:nvGrpSpPr>
+        <p:cNvPr id="1" name=""/>
+        <p:cNvGrpSpPr/>
+        <p:nvPr/>
+      </p:nvGrpSpPr>
+      <p:grpSpPr>
+        <a:xfrm>
+          <a:off x="0" y="0"/>
+          <a:ext cx="0" cy="0"/>
+          <a:chOff x="0" y="0"/>
+          <a:chExt cx="0" cy="0"/>
+        </a:xfrm>
+      </p:grpSpPr>
+      <p:sp>
+        <p:nvSpPr>
+          <p:cNvPr id="2" name="Title 1"/>
+          <p:cNvSpPr>
+            <a:spLocks noGrp="1"/>
+          </p:cNvSpPr>
+          <p:nvPr>
+            <p:ph type="title"/>
+          </p:nvPr>
+        </p:nvSpPr>
+        <p:spPr/>
+        <p:txBody>
+          <a:bodyPr/>
+          <a:lstStyle/>
+          <a:p>
+            <a:pPr lvl="0"/>
+            <a:r>
+              <a:rPr lang="en-US" dirty="0" smtClean="0"/>
+              <a:t>Proposed design</a:t>
+            </a:r>
+            <a:endParaRPr lang="en-US" dirty="0"/>
+          </a:p>
+        </p:txBody>
+      </p:sp>
+      <p:sp>
+        <p:nvSpPr>
+          <p:cNvPr id="3" name="Text Placeholder 2"/>
+          <p:cNvSpPr>
+            <a:spLocks noGrp="1"/>
+          </p:cNvSpPr>
+          <p:nvPr>
+            <p:ph type="body" idx="1"/>
+          </p:nvPr>
+        </p:nvSpPr>
+        <p:spPr/>
+        <p:txBody>
+          <a:bodyPr/>
+          <a:lstStyle/>
+          <a:p>
+            <a:endParaRPr lang="en-US" dirty="0"/>
+          </a:p>
+        </p:txBody>
+      </p:sp>
+      <p:pic>
+        <p:nvPicPr>
+          <p:cNvPr id="4" name="Picture 3" descr="compositeSchema.png"/>
+          <p:cNvPicPr>
+            <a:picLocks noChangeAspect="1"/>
+          </p:cNvPicPr>
+          <p:nvPr/>
+        </p:nvPicPr>
+        <p:blipFill>
+          <a:blip r:embed="rId2">
+            <a:extLst>
+              <a:ext uri="{28A0092B-C50C-407E-A947-70E740481C1C}">
+                <a14:useLocalDpi xmlns:a14="http://schemas.microsoft.com/office/drawing/2010/main" val="0"/>
+              </a:ext>
+            </a:extLst>
+          </a:blip>
+          <a:stretch>
+            <a:fillRect/>
+          </a:stretch>
+        </p:blipFill>
+        <p:spPr>
+          <a:xfrm>
+            <a:off x="466766" y="1100628"/>
+            <a:ext cx="7978442" cy="4998779"/>
+          </a:xfrm>
+          <a:prstGeom prst="rect">
+            <a:avLst/>
+          </a:prstGeom>
+        </p:spPr>
+      </p:pic>
+    </p:spTree>
+    <p:extLst>
+      <p:ext uri="{BB962C8B-B14F-4D97-AF65-F5344CB8AC3E}">
+        <p14:creationId xmlns:p14="http://schemas.microsoft.com/office/powerpoint/2010/main" val="792332516"/>
+      </p:ext>
+    </p:extLst>
+  </p:cSld>
+  <p:clrMapOvr>
+    <a:masterClrMapping/>
+  </p:clrMapOvr>
+  <p:timing>
+    <p:tnLst>
+      <p:par>
+        <p:cTn xmlns:p14="http://schemas.microsoft.com/office/powerpoint/2010/main" id="1" dur="indefinite" restart="never" nodeType="tmRoot"/>
+      </p:par>
+    </p:tnLst>
+  </p:timing>
+</p:sld>
+</file>
+
+<file path=ppt/slides/slide14.xml><?xml version="1.0" encoding="utf-8"?>
+<p:sld xmlns:a="http://schemas.openxmlformats.org/drawingml/2006/main" xmlns:r="http://schemas.openxmlformats.org/officeDocument/2006/relationships" xmlns:p="http://schemas.openxmlformats.org/presentationml/2006/main">
+  <p:cSld>
+    <p:spTree>
+      <p:nvGrpSpPr>
+        <p:cNvPr id="1" name=""/>
+        <p:cNvGrpSpPr/>
+        <p:nvPr/>
+      </p:nvGrpSpPr>
+      <p:grpSpPr>
+        <a:xfrm>
+          <a:off x="0" y="0"/>
+          <a:ext cx="0" cy="0"/>
+          <a:chOff x="0" y="0"/>
+          <a:chExt cx="0" cy="0"/>
+        </a:xfrm>
+      </p:grpSpPr>
+      <p:sp>
+        <p:nvSpPr>
+          <p:cNvPr id="2" name="Title 1"/>
+          <p:cNvSpPr>
+            <a:spLocks noGrp="1"/>
+          </p:cNvSpPr>
+          <p:nvPr>
+            <p:ph type="title"/>
+          </p:nvPr>
+        </p:nvSpPr>
+        <p:spPr/>
+        <p:txBody>
+          <a:bodyPr/>
+          <a:lstStyle/>
+          <a:p>
+            <a:r>
+              <a:rPr lang="en-US" dirty="0" smtClean="0"/>
+              <a:t>Ballot Timelines</a:t>
+            </a:r>
+            <a:endParaRPr lang="en-US" dirty="0"/>
+          </a:p>
+        </p:txBody>
+      </p:sp>
+      <p:sp>
+        <p:nvSpPr>
+          <p:cNvPr id="3" name="Text Placeholder 2"/>
+          <p:cNvSpPr>
+            <a:spLocks noGrp="1"/>
+          </p:cNvSpPr>
+          <p:nvPr>
+            <p:ph type="body" idx="1"/>
+          </p:nvPr>
+        </p:nvSpPr>
+        <p:spPr/>
+        <p:txBody>
+          <a:bodyPr>
+            <a:normAutofit/>
+          </a:bodyPr>
+          <a:lstStyle/>
+          <a:p>
+            <a:pPr lvl="1"/>
+            <a:r>
+              <a:rPr lang="en-US" sz="2800" dirty="0" smtClean="0"/>
+              <a:t> May ballot final content deadline is April 1</a:t>
+            </a:r>
+            <a:r>
+              <a:rPr lang="en-US" sz="2800" baseline="30000" dirty="0" smtClean="0"/>
+              <a:t>st</a:t>
+            </a:r>
+            <a:endParaRPr lang="en-US" sz="2800" dirty="0" smtClean="0"/>
+          </a:p>
+          <a:p>
+            <a:pPr lvl="1"/>
+            <a:r>
+              <a:rPr lang="en-US" sz="2800" dirty="0" smtClean="0"/>
+              <a:t> </a:t>
+            </a:r>
+            <a:r>
+              <a:rPr lang="en-US" sz="2800" dirty="0" err="1" smtClean="0"/>
+              <a:t>Workstreams</a:t>
+            </a:r>
+            <a:r>
+              <a:rPr lang="en-US" sz="2800" dirty="0" smtClean="0"/>
+              <a:t>:</a:t>
+            </a:r>
+          </a:p>
+          <a:p>
+            <a:pPr lvl="2"/>
+            <a:r>
+              <a:rPr lang="en-US" sz="2800" dirty="0" smtClean="0"/>
+              <a:t>Apply approved changes from STU comments</a:t>
+            </a:r>
+          </a:p>
+          <a:p>
+            <a:pPr lvl="2"/>
+            <a:r>
+              <a:rPr lang="en-US" sz="2800" dirty="0" smtClean="0"/>
+              <a:t>Extend </a:t>
+            </a:r>
+            <a:r>
+              <a:rPr lang="en-US" sz="2800" dirty="0" err="1" smtClean="0"/>
+              <a:t>HeD</a:t>
+            </a:r>
+            <a:r>
+              <a:rPr lang="en-US" sz="2800" dirty="0" smtClean="0"/>
+              <a:t> design to support composition</a:t>
+            </a:r>
+          </a:p>
+          <a:p>
+            <a:pPr lvl="2"/>
+            <a:r>
+              <a:rPr lang="en-US" sz="2800" dirty="0" smtClean="0"/>
+              <a:t>Prepare STU ballot for </a:t>
+            </a:r>
+            <a:r>
+              <a:rPr lang="en-US" sz="2800" dirty="0" err="1" smtClean="0"/>
+              <a:t>HeD</a:t>
+            </a:r>
+            <a:r>
+              <a:rPr lang="en-US" sz="2800" dirty="0" smtClean="0"/>
+              <a:t> KAS</a:t>
+            </a:r>
+          </a:p>
+          <a:p>
+            <a:pPr lvl="2"/>
+            <a:r>
+              <a:rPr lang="en-US" sz="2800" dirty="0" smtClean="0"/>
+              <a:t>Prepare ballot for conceptual model</a:t>
+            </a:r>
+          </a:p>
+          <a:p>
+            <a:pPr marL="237744" lvl="2" indent="0">
+              <a:buNone/>
+            </a:pPr>
+            <a:endParaRPr lang="en-US" sz="2800" dirty="0" smtClean="0"/>
+          </a:p>
+        </p:txBody>
+      </p:sp>
+    </p:spTree>
+    <p:extLst>
+      <p:ext uri="{BB962C8B-B14F-4D97-AF65-F5344CB8AC3E}">
+        <p14:creationId xmlns:p14="http://schemas.microsoft.com/office/powerpoint/2010/main" val="2040674954"/>
+      </p:ext>
+    </p:extLst>
+  </p:cSld>
+  <p:clrMapOvr>
+    <a:masterClrMapping/>
+  </p:clrMapOvr>
+  <p:timing>
+    <p:tnLst>
+      <p:par>
+        <p:cTn xmlns:p14="http://schemas.microsoft.com/office/powerpoint/2010/main" id="1" dur="indefinite" restart="never" nodeType="tmRoot"/>
+      </p:par>
+    </p:tnLst>
+  </p:timing>
+</p:sld>
+</file>
+
+<file path=ppt/slides/slide15.xml><?xml version="1.0" encoding="utf-8"?>
+<p:sld xmlns:a="http://schemas.openxmlformats.org/drawingml/2006/main" xmlns:r="http://schemas.openxmlformats.org/officeDocument/2006/relationships" xmlns:p="http://schemas.openxmlformats.org/presentationml/2006/main">
+  <p:cSld>
+    <p:spTree>
+      <p:nvGrpSpPr>
+        <p:cNvPr id="1" name=""/>
+        <p:cNvGrpSpPr/>
+        <p:nvPr/>
+      </p:nvGrpSpPr>
+      <p:grpSpPr>
+        <a:xfrm>
+          <a:off x="0" y="0"/>
+          <a:ext cx="0" cy="0"/>
+          <a:chOff x="0" y="0"/>
+          <a:chExt cx="0" cy="0"/>
+        </a:xfrm>
+      </p:grpSpPr>
+      <p:sp>
+        <p:nvSpPr>
+          <p:cNvPr id="2" name="Title 1"/>
+          <p:cNvSpPr>
+            <a:spLocks noGrp="1"/>
+          </p:cNvSpPr>
+          <p:nvPr>
+            <p:ph type="title"/>
+          </p:nvPr>
+        </p:nvSpPr>
+        <p:spPr/>
+        <p:txBody>
+          <a:bodyPr/>
+          <a:lstStyle/>
+          <a:p>
+            <a:pPr marL="178308" lvl="0" indent="0">
+              <a:buNone/>
+            </a:pPr>
+            <a:r>
+              <a:rPr lang="en-US" sz="2400" dirty="0" smtClean="0"/>
+              <a:t> Proposed Schedule</a:t>
+            </a:r>
+            <a:endParaRPr lang="en-US" dirty="0"/>
+          </a:p>
+        </p:txBody>
+      </p:sp>
+      <p:sp>
+        <p:nvSpPr>
+          <p:cNvPr id="3" name="Text Placeholder 2"/>
+          <p:cNvSpPr>
+            <a:spLocks noGrp="1"/>
+          </p:cNvSpPr>
+          <p:nvPr>
+            <p:ph type="body" idx="1"/>
+          </p:nvPr>
+        </p:nvSpPr>
+        <p:spPr/>
+        <p:txBody>
+          <a:bodyPr/>
+          <a:lstStyle/>
+          <a:p>
+            <a:pPr lvl="0"/>
+            <a:r>
+              <a:rPr lang="en-US" sz="2400" dirty="0" smtClean="0"/>
+              <a:t>Bandwidth for full ballot by May limited</a:t>
+            </a:r>
+          </a:p>
+          <a:p>
+            <a:pPr lvl="0"/>
+            <a:r>
+              <a:rPr lang="en-US" sz="2400" dirty="0" smtClean="0"/>
+              <a:t>Suggest aiming for</a:t>
+            </a:r>
+            <a:r>
+              <a:rPr lang="en-US" sz="2400" baseline="0" dirty="0" smtClean="0"/>
+              <a:t> a STU update release with </a:t>
+            </a:r>
+            <a:r>
+              <a:rPr lang="en-US" sz="2400" baseline="0" dirty="0" err="1" smtClean="0"/>
+              <a:t>errrata</a:t>
+            </a:r>
+            <a:r>
+              <a:rPr lang="en-US" sz="2400" baseline="0" dirty="0" smtClean="0"/>
+              <a:t> by May</a:t>
+            </a:r>
+          </a:p>
+          <a:p>
+            <a:pPr lvl="0"/>
+            <a:r>
+              <a:rPr lang="en-US" sz="2400" dirty="0" smtClean="0"/>
+              <a:t>Target September for ballot</a:t>
+            </a:r>
+            <a:r>
+              <a:rPr lang="en-US" sz="2400" baseline="0" dirty="0" smtClean="0"/>
+              <a:t> of STU update and Conceptual Model</a:t>
+            </a:r>
+            <a:r>
+              <a:rPr lang="en-US" sz="2400" dirty="0" smtClean="0"/>
+              <a:t>	</a:t>
+            </a:r>
+            <a:endParaRPr lang="en-US" sz="2400" baseline="0" dirty="0" smtClean="0"/>
+          </a:p>
+        </p:txBody>
+      </p:sp>
+    </p:spTree>
+    <p:extLst>
+      <p:ext uri="{BB962C8B-B14F-4D97-AF65-F5344CB8AC3E}">
+        <p14:creationId xmlns:p14="http://schemas.microsoft.com/office/powerpoint/2010/main" val="910160833"/>
+      </p:ext>
+    </p:extLst>
+  </p:cSld>
+  <p:clrMapOvr>
+    <a:masterClrMapping/>
+  </p:clrMapOvr>
+  <p:timing>
+    <p:tnLst>
+      <p:par>
+        <p:cTn xmlns:p14="http://schemas.microsoft.com/office/powerpoint/2010/main" id="1" dur="indefinite" restart="never" nodeType="tmRoot"/>
+      </p:par>
+    </p:tnLst>
+  </p:timing>
+</p:sld>
+</file>
+
+<file path=ppt/slides/slide16.xml><?xml version="1.0" encoding="utf-8"?>
+<p:sld xmlns:a="http://schemas.openxmlformats.org/drawingml/2006/main" xmlns:r="http://schemas.openxmlformats.org/officeDocument/2006/relationships" xmlns:p="http://schemas.openxmlformats.org/presentationml/2006/main">
+  <p:cSld>
+    <p:spTree>
+      <p:nvGrpSpPr>
+        <p:cNvPr id="1" name=""/>
+        <p:cNvGrpSpPr/>
+        <p:nvPr/>
+      </p:nvGrpSpPr>
+      <p:grpSpPr>
+        <a:xfrm>
+          <a:off x="0" y="0"/>
+          <a:ext cx="0" cy="0"/>
+          <a:chOff x="0" y="0"/>
+          <a:chExt cx="0" cy="0"/>
+        </a:xfrm>
+      </p:grpSpPr>
+      <p:sp>
+        <p:nvSpPr>
+          <p:cNvPr id="2" name="Title 1"/>
+          <p:cNvSpPr>
+            <a:spLocks noGrp="1"/>
+          </p:cNvSpPr>
+          <p:nvPr>
+            <p:ph type="title"/>
+          </p:nvPr>
+        </p:nvSpPr>
+        <p:spPr>
+          <a:xfrm>
+            <a:off x="714541" y="2720172"/>
+            <a:ext cx="7726670" cy="548640"/>
+          </a:xfrm>
+        </p:spPr>
+        <p:txBody>
+          <a:bodyPr/>
+          <a:lstStyle/>
+          <a:p>
+            <a:pPr algn="ctr"/>
+            <a:r>
+              <a:rPr lang="en-US" dirty="0" smtClean="0"/>
+              <a:t>Questions?</a:t>
+            </a:r>
+            <a:endParaRPr lang="en-US" dirty="0"/>
+          </a:p>
+        </p:txBody>
+      </p:sp>
+    </p:spTree>
+    <p:extLst>
+      <p:ext uri="{BB962C8B-B14F-4D97-AF65-F5344CB8AC3E}">
+        <p14:creationId xmlns:p14="http://schemas.microsoft.com/office/powerpoint/2010/main" val="3873101453"/>
       </p:ext>
     </p:extLst>
   </p:cSld>
@@ -5823,21 +6666,12 @@
               <a:rPr lang="en-US" dirty="0" smtClean="0"/>
               <a:t>Background</a:t>
             </a:r>
-            <a:endParaRPr lang="en-US" dirty="0" smtClean="0"/>
           </a:p>
           <a:p>
             <a:pPr lvl="1"/>
             <a:r>
-              <a:rPr lang="en-US" dirty="0" smtClean="0"/>
-              <a:t>Sponsor, Team </a:t>
-            </a:r>
-            <a:r>
-              <a:rPr lang="en-US" smtClean="0"/>
-              <a:t>&amp; </a:t>
-            </a:r>
-            <a:r>
-              <a:rPr lang="en-US" smtClean="0"/>
-              <a:t>Contributors </a:t>
+              <a:rPr lang="en-US" smtClean="0"/>
+              <a:t>Engagement Points</a:t>
             </a:r>
             <a:endParaRPr lang="en-US" dirty="0" smtClean="0"/>
           </a:p>
@@ -5871,7 +6705,6 @@
               <a:rPr lang="en-US" dirty="0" smtClean="0"/>
               <a:t>Composite KNART</a:t>
             </a:r>
-            <a:endParaRPr lang="en-US" dirty="0" smtClean="0"/>
           </a:p>
           <a:p>
             <a:pPr lvl="1"/>
@@ -5879,7 +6712,6 @@
               <a:rPr lang="en-US" dirty="0" smtClean="0"/>
               <a:t>Ballot Timelines</a:t>
             </a:r>
-            <a:endParaRPr lang="en-US" dirty="0" smtClean="0"/>
           </a:p>
           <a:p>
             <a:pPr lvl="1"/>
@@ -6134,7 +6966,7 @@
           <a:p>
             <a:r>
               <a:rPr lang="en-US" dirty="0" smtClean="0"/>
-              <a:t>Sponsor, team &amp; contributors</a:t>
+              <a:t>Engagement points</a:t>
             </a:r>
             <a:endParaRPr lang="en-US" dirty="0"/>
           </a:p>
@@ -6153,581 +6985,153 @@
         <p:spPr>
           <a:xfrm>
             <a:off x="822960" y="1100629"/>
-            <a:ext cx="7520940" cy="2527410"/>
+            <a:ext cx="7520940" cy="4935062"/>
           </a:xfrm>
         </p:spPr>
         <p:txBody>
           <a:bodyPr>
-            <a:normAutofit/>
+            <a:normAutofit fontScale="92500"/>
           </a:bodyPr>
           <a:lstStyle/>
           <a:p>
             <a:pPr lvl="1"/>
             <a:r>
+              <a:rPr lang="en-US" baseline="0" dirty="0" smtClean="0"/>
+              <a:t> Weekly calls at 11 ET on Thursdays</a:t>
+            </a:r>
+          </a:p>
+          <a:p>
+            <a:pPr lvl="1"/>
+            <a:endParaRPr lang="en-US" baseline="0" dirty="0" smtClean="0"/>
+          </a:p>
+          <a:p>
+            <a:pPr lvl="1"/>
+            <a:r>
+              <a:rPr lang="en-US" baseline="0" dirty="0" smtClean="0"/>
+              <a:t> listserv </a:t>
+            </a:r>
+            <a:r>
+              <a:rPr lang="en-US" baseline="0" dirty="0" smtClean="0">
+                <a:hlinkClick r:id="rId3"/>
+              </a:rPr>
+              <a:t>knart@lists.hl7.org</a:t>
+            </a:r>
+            <a:endParaRPr lang="en-US" baseline="0" dirty="0" smtClean="0"/>
+          </a:p>
+          <a:p>
+            <a:pPr lvl="1"/>
+            <a:endParaRPr lang="en-US" baseline="0" dirty="0" smtClean="0"/>
+          </a:p>
+          <a:p>
+            <a:pPr lvl="1"/>
+            <a:r>
+              <a:rPr lang="en-US" baseline="0" dirty="0" smtClean="0"/>
+              <a:t>Repositories:</a:t>
+            </a:r>
+          </a:p>
+          <a:p>
+            <a:pPr lvl="2"/>
+            <a:r>
+              <a:rPr lang="en-US" baseline="0" dirty="0" smtClean="0"/>
+              <a:t> </a:t>
+            </a:r>
+            <a:r>
+              <a:rPr lang="en-US" dirty="0">
+                <a:hlinkClick r:id="rId4"/>
+              </a:rPr>
+              <a:t>https://github.com/HL7/composite-</a:t>
+            </a:r>
+            <a:r>
               <a:rPr lang="en-US" dirty="0" smtClean="0">
-                <a:solidFill>
-                  <a:srgbClr val="FF0000"/>
-                </a:solidFill>
+                <a:hlinkClick r:id="rId4"/>
               </a:rPr>
-              <a:t>THIS IS STILL THE OLD SLIDE-</a:t>
-            </a:r>
-            <a:r>
-              <a:rPr lang="en-US" baseline="0" dirty="0" smtClean="0">
-                <a:solidFill>
-                  <a:srgbClr val="FF0000"/>
-                </a:solidFill>
+              <a:t>knart</a:t>
+            </a:r>
+            <a:endParaRPr lang="en-US" dirty="0" smtClean="0"/>
+          </a:p>
+          <a:p>
+            <a:pPr lvl="2"/>
+            <a:r>
+              <a:rPr lang="en-US" dirty="0" smtClean="0">
+                <a:hlinkClick r:id="rId5"/>
               </a:rPr>
-              <a:t> REMOVE?</a:t>
-            </a:r>
-            <a:endParaRPr lang="en-US" dirty="0" smtClean="0">
-              <a:solidFill>
-                <a:srgbClr val="FF0000"/>
-              </a:solidFill>
-            </a:endParaRPr>
+              <a:t> http</a:t>
+            </a:r>
+            <a:r>
+              <a:rPr lang="en-US" dirty="0">
+                <a:hlinkClick r:id="rId5"/>
+              </a:rPr>
+              <a:t>://wiki.hl7.org/index.php?title=</a:t>
+            </a:r>
+            <a:r>
+              <a:rPr lang="en-US" dirty="0" smtClean="0">
+                <a:hlinkClick r:id="rId5"/>
+              </a:rPr>
+              <a:t>Composite_KNART</a:t>
+            </a:r>
+            <a:endParaRPr lang="en-US" dirty="0" smtClean="0"/>
+          </a:p>
+          <a:p>
+            <a:pPr lvl="2"/>
+            <a:r>
+              <a:rPr lang="en-US" dirty="0" smtClean="0"/>
+              <a:t> https</a:t>
+            </a:r>
+            <a:r>
+              <a:rPr lang="en-US" dirty="0"/>
+              <a:t>://gforge.hl7.org/</a:t>
+            </a:r>
+            <a:r>
+              <a:rPr lang="en-US" dirty="0" err="1"/>
+              <a:t>gf</a:t>
+            </a:r>
+            <a:r>
+              <a:rPr lang="en-US" dirty="0"/>
+              <a:t>/project/</a:t>
+            </a:r>
+            <a:r>
+              <a:rPr lang="en-US" dirty="0" err="1"/>
+              <a:t>soageneral</a:t>
+            </a:r>
+            <a:r>
+              <a:rPr lang="en-US" dirty="0"/>
+              <a:t>/</a:t>
+            </a:r>
+            <a:r>
+              <a:rPr lang="en-US" dirty="0" err="1"/>
+              <a:t>scmsvn</a:t>
+            </a:r>
+            <a:r>
+              <a:rPr lang="en-US" dirty="0"/>
+              <a:t>/?action=</a:t>
+            </a:r>
+            <a:r>
+              <a:rPr lang="en-US" dirty="0" err="1"/>
+              <a:t>browse&amp;path</a:t>
+            </a:r>
+            <a:r>
+              <a:rPr lang="en-US" dirty="0"/>
+              <a:t>=%2Ftrunk%2FModels%2F</a:t>
+            </a:r>
+          </a:p>
+          <a:p>
+            <a:pPr lvl="2"/>
+            <a:endParaRPr lang="en-US" dirty="0" smtClean="0"/>
           </a:p>
           <a:p>
             <a:pPr lvl="1"/>
-            <a:r>
-              <a:rPr lang="en-US" dirty="0" smtClean="0"/>
-              <a:t>Status </a:t>
-            </a:r>
-            <a:r>
-              <a:rPr lang="en-US" dirty="0" smtClean="0"/>
-              <a:t>assessment &amp; recommendations</a:t>
-            </a:r>
+            <a:endParaRPr lang="en-US" baseline="0" dirty="0" smtClean="0"/>
           </a:p>
           <a:p>
             <a:pPr lvl="1"/>
             <a:r>
-              <a:rPr lang="en-US" dirty="0" smtClean="0"/>
-              <a:t>Funded </a:t>
-            </a:r>
-            <a:r>
-              <a:rPr lang="en-US" dirty="0" smtClean="0"/>
-              <a:t>in part by VA Knowledge Based Systems’ Knowledge Artifact research contract</a:t>
-            </a:r>
-            <a:endParaRPr lang="en-US" dirty="0"/>
-          </a:p>
-          <a:p>
-            <a:pPr lvl="1"/>
-            <a:r>
-              <a:rPr lang="en-US" dirty="0" smtClean="0"/>
-              <a:t>May </a:t>
-            </a:r>
-            <a:r>
-              <a:rPr lang="mr-IN" dirty="0" smtClean="0"/>
-              <a:t>–</a:t>
-            </a:r>
-            <a:r>
-              <a:rPr lang="en-US" dirty="0" smtClean="0"/>
-              <a:t> Sept </a:t>
-            </a:r>
-            <a:r>
-              <a:rPr lang="en-US" dirty="0" smtClean="0"/>
-              <a:t>2017</a:t>
+              <a:rPr lang="en-US" baseline="0" dirty="0" smtClean="0"/>
+              <a:t> Requirements and input drawn from VA HL7 Knowledge Artifacts project </a:t>
             </a:r>
             <a:endParaRPr lang="en-US" dirty="0" smtClean="0"/>
           </a:p>
         </p:txBody>
       </p:sp>
-      <p:graphicFrame>
-        <p:nvGraphicFramePr>
-          <p:cNvPr id="6" name="Table 5"/>
-          <p:cNvGraphicFramePr>
-            <a:graphicFrameLocks noGrp="1"/>
-          </p:cNvGraphicFramePr>
-          <p:nvPr>
-            <p:extLst>
-              <p:ext uri="{D42A27DB-BD31-4B8C-83A1-F6EECF244321}">
-                <p14:modId xmlns:p14="http://schemas.microsoft.com/office/powerpoint/2010/main" val="124010566"/>
-              </p:ext>
-            </p:extLst>
-          </p:nvPr>
-        </p:nvGraphicFramePr>
-        <p:xfrm>
-          <a:off x="1369116" y="3628039"/>
-          <a:ext cx="6096000" cy="2676753"/>
-        </p:xfrm>
-        <a:graphic>
-          <a:graphicData uri="http://schemas.openxmlformats.org/drawingml/2006/table">
-            <a:tbl>
-              <a:tblPr firstRow="1" bandRow="1">
-                <a:tableStyleId>{5C22544A-7EE6-4342-B048-85BDC9FD1C3A}</a:tableStyleId>
-              </a:tblPr>
-              <a:tblGrid>
-                <a:gridCol w="2032000"/>
-                <a:gridCol w="2032000"/>
-                <a:gridCol w="2032000"/>
-              </a:tblGrid>
-              <a:tr h="2676753">
-                <a:tc>
-                  <a:txBody>
-                    <a:bodyPr/>
-                    <a:lstStyle/>
-                    <a:p>
-                      <a:r>
-                        <a:rPr lang="en-US" dirty="0" smtClean="0">
-                          <a:solidFill>
-                            <a:schemeClr val="tx1"/>
-                          </a:solidFill>
-                        </a:rPr>
-                        <a:t>Jerry </a:t>
-                      </a:r>
-                      <a:r>
-                        <a:rPr lang="en-US" dirty="0" err="1" smtClean="0">
-                          <a:solidFill>
-                            <a:schemeClr val="tx1"/>
-                          </a:solidFill>
-                        </a:rPr>
-                        <a:t>Goodnough</a:t>
-                      </a:r>
-                      <a:endParaRPr lang="en-US" dirty="0" smtClean="0">
-                        <a:solidFill>
-                          <a:schemeClr val="tx1"/>
-                        </a:solidFill>
-                      </a:endParaRPr>
-                    </a:p>
-                    <a:p>
-                      <a:r>
-                        <a:rPr lang="en-US" dirty="0" smtClean="0">
-                          <a:solidFill>
-                            <a:schemeClr val="tx1"/>
-                          </a:solidFill>
-                        </a:rPr>
-                        <a:t>Davide Sottara</a:t>
-                      </a:r>
-                    </a:p>
-                    <a:p>
-                      <a:r>
-                        <a:rPr lang="en-US" dirty="0" smtClean="0">
-                          <a:solidFill>
-                            <a:schemeClr val="tx1"/>
-                          </a:solidFill>
-                        </a:rPr>
-                        <a:t>Claude Nanjo</a:t>
-                      </a:r>
-                    </a:p>
-                    <a:p>
-                      <a:r>
-                        <a:rPr lang="en-US" dirty="0" smtClean="0">
-                          <a:solidFill>
-                            <a:schemeClr val="tx1"/>
-                          </a:solidFill>
-                        </a:rPr>
-                        <a:t>Frank </a:t>
-                      </a:r>
-                      <a:r>
-                        <a:rPr lang="en-US" dirty="0" err="1" smtClean="0">
-                          <a:solidFill>
-                            <a:schemeClr val="tx1"/>
-                          </a:solidFill>
-                        </a:rPr>
-                        <a:t>Breyette</a:t>
-                      </a:r>
-                      <a:endParaRPr lang="en-US" dirty="0" smtClean="0">
-                        <a:solidFill>
-                          <a:schemeClr val="tx1"/>
-                        </a:solidFill>
-                      </a:endParaRPr>
-                    </a:p>
-                    <a:p>
-                      <a:r>
-                        <a:rPr lang="en-US" dirty="0" smtClean="0">
-                          <a:solidFill>
-                            <a:schemeClr val="tx1"/>
-                          </a:solidFill>
-                        </a:rPr>
-                        <a:t>Rebecca Baker</a:t>
-                      </a:r>
-                    </a:p>
-                    <a:p>
-                      <a:r>
-                        <a:rPr lang="en-US" dirty="0" smtClean="0">
-                          <a:solidFill>
-                            <a:schemeClr val="tx1"/>
-                          </a:solidFill>
-                        </a:rPr>
-                        <a:t>Patrick Langford</a:t>
-                      </a:r>
-                    </a:p>
-                    <a:p>
-                      <a:r>
-                        <a:rPr lang="en-US" dirty="0" smtClean="0">
-                          <a:solidFill>
-                            <a:schemeClr val="tx1"/>
-                          </a:solidFill>
-                        </a:rPr>
-                        <a:t>Bas van den </a:t>
-                      </a:r>
-                      <a:r>
-                        <a:rPr lang="en-US" dirty="0" err="1" smtClean="0">
-                          <a:solidFill>
-                            <a:schemeClr val="tx1"/>
-                          </a:solidFill>
-                        </a:rPr>
-                        <a:t>Heuvel</a:t>
-                      </a:r>
-                      <a:endParaRPr lang="en-US" dirty="0" smtClean="0">
-                        <a:solidFill>
-                          <a:schemeClr val="tx1"/>
-                        </a:solidFill>
-                      </a:endParaRPr>
-                    </a:p>
-                    <a:p>
-                      <a:r>
-                        <a:rPr lang="en-US" dirty="0" smtClean="0">
-                          <a:solidFill>
-                            <a:schemeClr val="tx1"/>
-                          </a:solidFill>
-                        </a:rPr>
-                        <a:t>Linda </a:t>
-                      </a:r>
-                      <a:r>
-                        <a:rPr lang="en-US" dirty="0" err="1" smtClean="0">
-                          <a:solidFill>
-                            <a:schemeClr val="tx1"/>
-                          </a:solidFill>
-                        </a:rPr>
-                        <a:t>Wedemeyer</a:t>
-                      </a:r>
-                      <a:endParaRPr lang="en-US" dirty="0" smtClean="0">
-                        <a:solidFill>
-                          <a:schemeClr val="tx1"/>
-                        </a:solidFill>
-                      </a:endParaRPr>
-                    </a:p>
-                  </a:txBody>
-                  <a:tcPr>
-                    <a:noFill/>
-                  </a:tcPr>
-                </a:tc>
-                <a:tc>
-                  <a:txBody>
-                    <a:bodyPr/>
-                    <a:lstStyle/>
-                    <a:p>
-                      <a:r>
-                        <a:rPr lang="en-US" dirty="0" smtClean="0">
-                          <a:solidFill>
-                            <a:schemeClr val="tx1"/>
-                          </a:solidFill>
-                        </a:rPr>
-                        <a:t>Stan Huff</a:t>
-                      </a:r>
-                    </a:p>
-                    <a:p>
-                      <a:r>
-                        <a:rPr lang="en-US" dirty="0" smtClean="0">
-                          <a:solidFill>
-                            <a:schemeClr val="tx1"/>
-                          </a:solidFill>
-                        </a:rPr>
-                        <a:t>Andrew Simms</a:t>
-                      </a:r>
-                    </a:p>
-                    <a:p>
-                      <a:r>
-                        <a:rPr lang="en-US" dirty="0" smtClean="0">
-                          <a:solidFill>
-                            <a:schemeClr val="tx1"/>
-                          </a:solidFill>
-                        </a:rPr>
-                        <a:t>Lorraine Constable</a:t>
-                      </a:r>
-                    </a:p>
-                    <a:p>
-                      <a:r>
-                        <a:rPr lang="en-US" dirty="0" smtClean="0">
-                          <a:solidFill>
-                            <a:schemeClr val="tx1"/>
-                          </a:solidFill>
-                        </a:rPr>
-                        <a:t>Emory Fry</a:t>
-                      </a:r>
-                    </a:p>
-                    <a:p>
-                      <a:r>
-                        <a:rPr lang="en-US" dirty="0" err="1" smtClean="0">
-                          <a:solidFill>
-                            <a:schemeClr val="tx1"/>
-                          </a:solidFill>
-                        </a:rPr>
-                        <a:t>Wendelyn</a:t>
-                      </a:r>
-                      <a:r>
-                        <a:rPr lang="en-US" dirty="0" smtClean="0">
-                          <a:solidFill>
-                            <a:schemeClr val="tx1"/>
-                          </a:solidFill>
-                        </a:rPr>
-                        <a:t> Bradley</a:t>
-                      </a:r>
-                    </a:p>
-                    <a:p>
-                      <a:r>
-                        <a:rPr lang="en-US" dirty="0" smtClean="0">
-                          <a:solidFill>
-                            <a:schemeClr val="tx1"/>
-                          </a:solidFill>
-                        </a:rPr>
-                        <a:t>Bruce Bray</a:t>
-                      </a:r>
-                    </a:p>
-                    <a:p>
-                      <a:r>
-                        <a:rPr lang="en-US" dirty="0" smtClean="0">
-                          <a:solidFill>
-                            <a:schemeClr val="tx1"/>
-                          </a:solidFill>
-                        </a:rPr>
-                        <a:t>Liz McCool</a:t>
-                      </a:r>
-                    </a:p>
-                    <a:p>
-                      <a:r>
-                        <a:rPr lang="en-US" dirty="0" err="1" smtClean="0">
-                          <a:solidFill>
-                            <a:schemeClr val="tx1"/>
-                          </a:solidFill>
-                        </a:rPr>
-                        <a:t>Seena</a:t>
-                      </a:r>
-                      <a:r>
-                        <a:rPr lang="en-US" dirty="0" smtClean="0">
-                          <a:solidFill>
-                            <a:schemeClr val="tx1"/>
-                          </a:solidFill>
-                        </a:rPr>
-                        <a:t> </a:t>
-                      </a:r>
-                      <a:r>
-                        <a:rPr lang="en-US" dirty="0" err="1" smtClean="0">
-                          <a:solidFill>
-                            <a:schemeClr val="tx1"/>
-                          </a:solidFill>
-                        </a:rPr>
-                        <a:t>Farzaneh</a:t>
-                      </a:r>
-                      <a:endParaRPr lang="en-US" dirty="0" smtClean="0">
-                        <a:solidFill>
-                          <a:schemeClr val="tx1"/>
-                        </a:solidFill>
-                      </a:endParaRPr>
-                    </a:p>
-                    <a:p>
-                      <a:pPr marL="0" marR="0" indent="0" algn="l" defTabSz="914400" rtl="0" eaLnBrk="1" fontAlgn="auto" latinLnBrk="0" hangingPunct="1">
-                        <a:lnSpc>
-                          <a:spcPct val="100000"/>
-                        </a:lnSpc>
-                        <a:spcBef>
-                          <a:spcPts val="0"/>
-                        </a:spcBef>
-                        <a:spcAft>
-                          <a:spcPts val="0"/>
-                        </a:spcAft>
-                        <a:buClrTx/>
-                        <a:buSzTx/>
-                        <a:buFontTx/>
-                        <a:buNone/>
-                        <a:tabLst/>
-                        <a:defRPr/>
-                      </a:pPr>
-                      <a:r>
-                        <a:rPr lang="en-US" dirty="0" smtClean="0">
-                          <a:solidFill>
-                            <a:schemeClr val="tx1"/>
-                          </a:solidFill>
-                        </a:rPr>
-                        <a:t>Bryn Rhodes</a:t>
-                      </a:r>
-                    </a:p>
-                  </a:txBody>
-                  <a:tcPr>
-                    <a:noFill/>
-                  </a:tcPr>
-                </a:tc>
-                <a:tc>
-                  <a:txBody>
-                    <a:bodyPr/>
-                    <a:lstStyle/>
-                    <a:p>
-                      <a:r>
-                        <a:rPr lang="en-US" dirty="0" smtClean="0">
-                          <a:solidFill>
-                            <a:schemeClr val="tx1"/>
-                          </a:solidFill>
-                        </a:rPr>
-                        <a:t>Rocky Reston</a:t>
-                      </a:r>
-                    </a:p>
-                    <a:p>
-                      <a:r>
-                        <a:rPr lang="en-US" dirty="0" smtClean="0">
-                          <a:solidFill>
-                            <a:schemeClr val="tx1"/>
-                          </a:solidFill>
-                        </a:rPr>
-                        <a:t>Muhammad </a:t>
-                      </a:r>
-                      <a:r>
-                        <a:rPr lang="en-US" dirty="0" err="1" smtClean="0">
-                          <a:solidFill>
-                            <a:schemeClr val="tx1"/>
-                          </a:solidFill>
-                        </a:rPr>
-                        <a:t>Asim</a:t>
-                      </a:r>
-                      <a:endParaRPr lang="en-US" dirty="0" smtClean="0">
-                        <a:solidFill>
-                          <a:schemeClr val="tx1"/>
-                        </a:solidFill>
-                      </a:endParaRPr>
-                    </a:p>
-                    <a:p>
-                      <a:r>
-                        <a:rPr lang="en-US" dirty="0" smtClean="0">
-                          <a:solidFill>
-                            <a:schemeClr val="tx1"/>
-                          </a:solidFill>
-                        </a:rPr>
-                        <a:t>Susan </a:t>
-                      </a:r>
-                      <a:r>
-                        <a:rPr lang="en-US" dirty="0" err="1" smtClean="0">
-                          <a:solidFill>
-                            <a:schemeClr val="tx1"/>
-                          </a:solidFill>
-                        </a:rPr>
-                        <a:t>Matney</a:t>
-                      </a:r>
-                      <a:endParaRPr lang="en-US" dirty="0" smtClean="0">
-                        <a:solidFill>
-                          <a:schemeClr val="tx1"/>
-                        </a:solidFill>
-                      </a:endParaRPr>
-                    </a:p>
-                    <a:p>
-                      <a:r>
-                        <a:rPr lang="en-US" dirty="0" smtClean="0">
-                          <a:solidFill>
-                            <a:schemeClr val="tx1"/>
-                          </a:solidFill>
-                        </a:rPr>
-                        <a:t>Omar </a:t>
-                      </a:r>
-                      <a:r>
-                        <a:rPr lang="en-US" dirty="0" err="1" smtClean="0">
-                          <a:solidFill>
-                            <a:schemeClr val="tx1"/>
-                          </a:solidFill>
-                        </a:rPr>
-                        <a:t>Bouhaddou</a:t>
-                      </a:r>
-                      <a:endParaRPr lang="en-US" dirty="0" smtClean="0">
-                        <a:solidFill>
-                          <a:schemeClr val="tx1"/>
-                        </a:solidFill>
-                      </a:endParaRPr>
-                    </a:p>
-                    <a:p>
-                      <a:r>
-                        <a:rPr lang="en-US" dirty="0" smtClean="0">
-                          <a:solidFill>
-                            <a:schemeClr val="tx1"/>
-                          </a:solidFill>
-                        </a:rPr>
-                        <a:t>Richard </a:t>
-                      </a:r>
-                      <a:r>
-                        <a:rPr lang="en-US" dirty="0" err="1" smtClean="0">
-                          <a:solidFill>
-                            <a:schemeClr val="tx1"/>
-                          </a:solidFill>
-                        </a:rPr>
-                        <a:t>Esmond</a:t>
-                      </a:r>
-                      <a:endParaRPr lang="en-US" dirty="0" smtClean="0">
-                        <a:solidFill>
-                          <a:schemeClr val="tx1"/>
-                        </a:solidFill>
-                      </a:endParaRPr>
-                    </a:p>
-                    <a:p>
-                      <a:r>
-                        <a:rPr lang="en-US" dirty="0" smtClean="0">
-                          <a:solidFill>
-                            <a:schemeClr val="tx1"/>
-                          </a:solidFill>
-                        </a:rPr>
-                        <a:t>Dennis Polling</a:t>
-                      </a:r>
-                    </a:p>
-                    <a:p>
-                      <a:r>
-                        <a:rPr lang="en-US" dirty="0" smtClean="0">
-                          <a:solidFill>
-                            <a:schemeClr val="tx1"/>
-                          </a:solidFill>
-                        </a:rPr>
-                        <a:t>Joey Coyle</a:t>
-                      </a:r>
-                    </a:p>
-                    <a:p>
-                      <a:r>
-                        <a:rPr lang="en-US" dirty="0" smtClean="0">
-                          <a:solidFill>
-                            <a:schemeClr val="tx1"/>
-                          </a:solidFill>
-                        </a:rPr>
-                        <a:t>Jonathan </a:t>
-                      </a:r>
-                      <a:r>
-                        <a:rPr lang="en-US" dirty="0" err="1" smtClean="0">
-                          <a:solidFill>
-                            <a:schemeClr val="tx1"/>
-                          </a:solidFill>
-                        </a:rPr>
-                        <a:t>Teich</a:t>
-                      </a:r>
-                      <a:endParaRPr lang="en-US" dirty="0" smtClean="0">
-                        <a:solidFill>
-                          <a:schemeClr val="tx1"/>
-                        </a:solidFill>
-                      </a:endParaRPr>
-                    </a:p>
-                    <a:p>
-                      <a:r>
-                        <a:rPr lang="en-US" dirty="0" smtClean="0">
-                          <a:solidFill>
-                            <a:schemeClr val="tx1"/>
-                          </a:solidFill>
-                        </a:rPr>
-                        <a:t>Chris </a:t>
-                      </a:r>
-                      <a:r>
-                        <a:rPr lang="en-US" dirty="0" err="1" smtClean="0">
-                          <a:solidFill>
-                            <a:schemeClr val="tx1"/>
-                          </a:solidFill>
-                        </a:rPr>
-                        <a:t>Melo</a:t>
-                      </a:r>
-                      <a:endParaRPr lang="en-US" dirty="0" smtClean="0">
-                        <a:solidFill>
-                          <a:schemeClr val="tx1"/>
-                        </a:solidFill>
-                      </a:endParaRPr>
-                    </a:p>
-                  </a:txBody>
-                  <a:tcPr>
-                    <a:noFill/>
-                  </a:tcPr>
-                </a:tc>
-              </a:tr>
-            </a:tbl>
-          </a:graphicData>
-        </a:graphic>
-      </p:graphicFrame>
     </p:spTree>
     <p:extLst>
       <p:ext uri="{BB962C8B-B14F-4D97-AF65-F5344CB8AC3E}">
@@ -6782,7 +7186,11 @@
           <a:p>
             <a:r>
               <a:rPr lang="en-US" dirty="0" smtClean="0"/>
-              <a:t>Conceptual Model</a:t>
+              <a:t>Conceptual </a:t>
+            </a:r>
+            <a:r>
+              <a:rPr lang="en-US" dirty="0" smtClean="0"/>
+              <a:t>Model approach</a:t>
             </a:r>
             <a:endParaRPr lang="en-US" dirty="0"/>
           </a:p>
@@ -6803,15 +7211,72 @@
           <a:bodyPr/>
           <a:lstStyle/>
           <a:p>
+            <a:pPr lvl="1"/>
             <a:r>
               <a:rPr lang="en-US" dirty="0" smtClean="0"/>
-              <a:t>What</a:t>
+              <a:t>Extract </a:t>
+            </a:r>
+            <a:r>
+              <a:rPr lang="en-US" dirty="0" smtClean="0"/>
+              <a:t>concepts</a:t>
             </a:r>
             <a:r>
               <a:rPr lang="en-US" baseline="0" dirty="0" smtClean="0"/>
-              <a:t> do we want to say here? Jerry’s context map? Other?</a:t>
-            </a:r>
-            <a:endParaRPr lang="en-US" dirty="0"/>
+              <a:t> from existing physical </a:t>
+            </a:r>
+            <a:r>
+              <a:rPr lang="en-US" baseline="0" dirty="0" smtClean="0"/>
+              <a:t>representations</a:t>
+            </a:r>
+          </a:p>
+          <a:p>
+            <a:pPr lvl="1"/>
+            <a:endParaRPr lang="en-US" baseline="0" dirty="0" smtClean="0"/>
+          </a:p>
+          <a:p>
+            <a:pPr lvl="1"/>
+            <a:r>
+              <a:rPr lang="en-US" baseline="0" dirty="0" smtClean="0"/>
+              <a:t>Review and align with </a:t>
+            </a:r>
+            <a:r>
+              <a:rPr lang="en-US" baseline="0" dirty="0" smtClean="0"/>
+              <a:t>API4KP</a:t>
+            </a:r>
+          </a:p>
+          <a:p>
+            <a:pPr lvl="1"/>
+            <a:endParaRPr lang="en-US" baseline="0" dirty="0" smtClean="0"/>
+          </a:p>
+          <a:p>
+            <a:pPr lvl="1"/>
+            <a:r>
+              <a:rPr lang="en-US" baseline="0" dirty="0" smtClean="0"/>
+              <a:t>Extend to cover concepts </a:t>
+            </a:r>
+            <a:r>
+              <a:rPr lang="en-US" baseline="0" dirty="0" smtClean="0"/>
+              <a:t>identified </a:t>
+            </a:r>
+            <a:r>
+              <a:rPr lang="en-US" baseline="0" dirty="0" smtClean="0"/>
+              <a:t>from clinical use cases in </a:t>
+            </a:r>
+            <a:r>
+              <a:rPr lang="en-US" baseline="0" dirty="0" smtClean="0"/>
+              <a:t>whitepaper delivered last cycle</a:t>
+            </a:r>
+          </a:p>
+          <a:p>
+            <a:pPr lvl="1"/>
+            <a:endParaRPr lang="en-US" baseline="0" dirty="0" smtClean="0"/>
+          </a:p>
+          <a:p>
+            <a:pPr lvl="3"/>
+            <a:r>
+              <a:rPr lang="en-US" baseline="0" dirty="0" smtClean="0"/>
+              <a:t>In particular, metadata around context and governance</a:t>
+            </a:r>
           </a:p>
         </p:txBody>
       </p:sp>
@@ -6825,6 +7290,13 @@
   <p:clrMapOvr>
     <a:masterClrMapping/>
   </p:clrMapOvr>
+  <p:timing>
+    <p:tnLst>
+      <p:par>
+        <p:cTn xmlns:p14="http://schemas.microsoft.com/office/powerpoint/2010/main" id="1" dur="indefinite" restart="never" nodeType="tmRoot"/>
+      </p:par>
+    </p:tnLst>
+  </p:timing>
 </p:sld>
 </file>
 
@@ -6865,115 +7337,55 @@
               <a:t>Hed</a:t>
             </a:r>
             <a:r>
-              <a:rPr lang="en-US" baseline="0" dirty="0" smtClean="0"/>
-              <a:t> </a:t>
-            </a:r>
-            <a:r>
-              <a:rPr lang="en-US" baseline="0" dirty="0" err="1" smtClean="0"/>
-              <a:t>kas</a:t>
+              <a:rPr lang="en-US" dirty="0" smtClean="0"/>
+              <a:t> diagram</a:t>
             </a:r>
             <a:endParaRPr lang="en-US" dirty="0"/>
           </a:p>
         </p:txBody>
       </p:sp>
-      <p:sp>
-        <p:nvSpPr>
-          <p:cNvPr id="3" name="Text Placeholder 2"/>
-          <p:cNvSpPr>
-            <a:spLocks noGrp="1"/>
-          </p:cNvSpPr>
-          <p:nvPr>
-            <p:ph type="body" idx="1"/>
-          </p:nvPr>
-        </p:nvSpPr>
+      <p:pic>
+        <p:nvPicPr>
+          <p:cNvPr id="6" name="Content Placeholder 5" descr="KnowledgeDocument.jpg"/>
+          <p:cNvPicPr>
+            <a:picLocks noGrp="1" noChangeAspect="1"/>
+          </p:cNvPicPr>
+          <p:nvPr>
+            <p:ph idx="1"/>
+          </p:nvPr>
+        </p:nvPicPr>
+        <p:blipFill>
+          <a:blip r:embed="rId2">
+            <a:extLst>
+              <a:ext uri="{28A0092B-C50C-407E-A947-70E740481C1C}">
+                <a14:useLocalDpi xmlns:a14="http://schemas.microsoft.com/office/drawing/2010/main" val="0"/>
+              </a:ext>
+            </a:extLst>
+          </a:blip>
+          <a:srcRect l="-59515" r="-59515"/>
+          <a:stretch>
+            <a:fillRect/>
+          </a:stretch>
+        </p:blipFill>
         <p:spPr/>
-        <p:txBody>
-          <a:bodyPr/>
-          <a:lstStyle/>
-          <a:p>
-            <a:r>
-              <a:rPr lang="en-US" sz="2400" dirty="0" smtClean="0"/>
-              <a:t>34 STU comments in queue</a:t>
-            </a:r>
-          </a:p>
-          <a:p>
-            <a:pPr lvl="2"/>
-            <a:r>
-              <a:rPr lang="en-US" sz="2000" dirty="0" smtClean="0"/>
-              <a:t>8 will</a:t>
-            </a:r>
-            <a:r>
-              <a:rPr lang="en-US" sz="2000" baseline="0" dirty="0" smtClean="0"/>
-              <a:t> be addressed in the Conceptual Model work</a:t>
-            </a:r>
-          </a:p>
-          <a:p>
-            <a:pPr lvl="2"/>
-            <a:r>
-              <a:rPr lang="en-US" sz="2000" baseline="0" dirty="0" smtClean="0"/>
-              <a:t>11 are candidates for an errata or STU update</a:t>
-            </a:r>
-          </a:p>
-          <a:p>
-            <a:pPr lvl="2"/>
-            <a:r>
-              <a:rPr lang="en-US" sz="2000" baseline="0" dirty="0" smtClean="0"/>
-              <a:t>8 are feature requests for STU release 2, including support for composition</a:t>
-            </a:r>
-          </a:p>
-          <a:p>
-            <a:pPr lvl="2"/>
-            <a:r>
-              <a:rPr lang="en-US" sz="2000" dirty="0" smtClean="0"/>
-              <a:t>Remainder are new entries not reviewed yet</a:t>
-            </a:r>
-          </a:p>
-          <a:p>
-            <a:pPr lvl="2"/>
-            <a:endParaRPr lang="en-US" sz="2000" dirty="0"/>
-          </a:p>
-          <a:p>
-            <a:pPr lvl="1"/>
-            <a:r>
-              <a:rPr lang="en-US" b="1" dirty="0"/>
-              <a:t>STU Comment page:</a:t>
-            </a:r>
-          </a:p>
-          <a:p>
-            <a:pPr lvl="1"/>
-            <a:r>
-              <a:rPr lang="en-US" sz="2000" dirty="0"/>
-              <a:t>http://www.hl7.org/</a:t>
-            </a:r>
-            <a:r>
-              <a:rPr lang="en-US" sz="2000" dirty="0" err="1"/>
-              <a:t>dstucomments</a:t>
-            </a:r>
-            <a:r>
-              <a:rPr lang="en-US" sz="2000" dirty="0"/>
-              <a:t>/</a:t>
-            </a:r>
-            <a:r>
-              <a:rPr lang="en-US" sz="2000" dirty="0" err="1"/>
-              <a:t>showdetail.cfm?dstuid</a:t>
-            </a:r>
-            <a:r>
-              <a:rPr lang="en-US" sz="2000" dirty="0"/>
-              <a:t>=156</a:t>
-            </a:r>
-          </a:p>
-        </p:txBody>
-      </p:sp>
+      </p:pic>
     </p:spTree>
     <p:extLst>
       <p:ext uri="{BB962C8B-B14F-4D97-AF65-F5344CB8AC3E}">
-        <p14:creationId xmlns:p14="http://schemas.microsoft.com/office/powerpoint/2010/main" val="1969642456"/>
+        <p14:creationId xmlns:p14="http://schemas.microsoft.com/office/powerpoint/2010/main" val="2380435224"/>
       </p:ext>
     </p:extLst>
   </p:cSld>
   <p:clrMapOvr>
     <a:masterClrMapping/>
   </p:clrMapOvr>
+  <p:timing>
+    <p:tnLst>
+      <p:par>
+        <p:cTn xmlns:p14="http://schemas.microsoft.com/office/powerpoint/2010/main" id="1" dur="indefinite" restart="never" nodeType="tmRoot"/>
+      </p:par>
+    </p:tnLst>
+  </p:timing>
 </p:sld>
 </file>
 
@@ -7010,65 +7422,59 @@
           <a:lstStyle/>
           <a:p>
             <a:r>
-              <a:rPr lang="en-US" dirty="0" smtClean="0"/>
-              <a:t>Composite </a:t>
-            </a:r>
-            <a:r>
               <a:rPr lang="en-US" dirty="0" err="1" smtClean="0"/>
-              <a:t>knarts</a:t>
+              <a:t>Hed</a:t>
+            </a:r>
+            <a:r>
+              <a:rPr lang="en-US" baseline="0" dirty="0" smtClean="0"/>
+              <a:t> metadata</a:t>
             </a:r>
             <a:endParaRPr lang="en-US" dirty="0"/>
           </a:p>
         </p:txBody>
       </p:sp>
-      <p:sp>
-        <p:nvSpPr>
-          <p:cNvPr id="3" name="Text Placeholder 2"/>
-          <p:cNvSpPr>
-            <a:spLocks noGrp="1"/>
-          </p:cNvSpPr>
-          <p:nvPr>
-            <p:ph type="body" idx="1"/>
-          </p:nvPr>
-        </p:nvSpPr>
+      <p:pic>
+        <p:nvPicPr>
+          <p:cNvPr id="4" name="Content Placeholder 3" descr="MetaData.jpg"/>
+          <p:cNvPicPr>
+            <a:picLocks noGrp="1" noChangeAspect="1"/>
+          </p:cNvPicPr>
+          <p:nvPr>
+            <p:ph idx="1"/>
+          </p:nvPr>
+        </p:nvPicPr>
+        <p:blipFill>
+          <a:blip r:embed="rId2">
+            <a:extLst>
+              <a:ext uri="{28A0092B-C50C-407E-A947-70E740481C1C}">
+                <a14:useLocalDpi xmlns:a14="http://schemas.microsoft.com/office/drawing/2010/main" val="0"/>
+              </a:ext>
+            </a:extLst>
+          </a:blip>
+          <a:srcRect t="-12068" b="-12068"/>
+          <a:stretch>
+            <a:fillRect/>
+          </a:stretch>
+        </p:blipFill>
         <p:spPr/>
-        <p:txBody>
-          <a:bodyPr/>
-          <a:lstStyle/>
-          <a:p>
-            <a:r>
-              <a:rPr lang="en-US" dirty="0" smtClean="0"/>
-              <a:t>Design principles</a:t>
-            </a:r>
-          </a:p>
-          <a:p>
-            <a:r>
-              <a:rPr lang="en-US" dirty="0" smtClean="0"/>
-              <a:t>Proposed design</a:t>
-            </a:r>
-          </a:p>
-          <a:p>
-            <a:r>
-              <a:rPr lang="en-US" dirty="0" smtClean="0"/>
-              <a:t>Do</a:t>
-            </a:r>
-            <a:r>
-              <a:rPr lang="en-US" baseline="0" dirty="0" smtClean="0"/>
-              <a:t> we want to use design view from Oxygen, or EA model here?</a:t>
-            </a:r>
-          </a:p>
-        </p:txBody>
-      </p:sp>
+      </p:pic>
     </p:spTree>
     <p:extLst>
       <p:ext uri="{BB962C8B-B14F-4D97-AF65-F5344CB8AC3E}">
-        <p14:creationId xmlns:p14="http://schemas.microsoft.com/office/powerpoint/2010/main" val="1841712993"/>
+        <p14:creationId xmlns:p14="http://schemas.microsoft.com/office/powerpoint/2010/main" val="1070389897"/>
       </p:ext>
     </p:extLst>
   </p:cSld>
   <p:clrMapOvr>
     <a:masterClrMapping/>
   </p:clrMapOvr>
+  <p:timing>
+    <p:tnLst>
+      <p:par>
+        <p:cTn xmlns:p14="http://schemas.microsoft.com/office/powerpoint/2010/main" id="1" dur="indefinite" restart="never" nodeType="tmRoot"/>
+      </p:par>
+    </p:tnLst>
+  </p:timing>
 </p:sld>
 </file>
 
@@ -7105,129 +7511,59 @@
           <a:lstStyle/>
           <a:p>
             <a:r>
+              <a:rPr lang="en-US" dirty="0" err="1" smtClean="0"/>
+              <a:t>Hed</a:t>
+            </a:r>
+            <a:r>
               <a:rPr lang="en-US" dirty="0" smtClean="0"/>
-              <a:t>Ballot Timelines</a:t>
+              <a:t> action Group</a:t>
             </a:r>
             <a:endParaRPr lang="en-US" dirty="0"/>
           </a:p>
         </p:txBody>
       </p:sp>
-      <p:sp>
-        <p:nvSpPr>
-          <p:cNvPr id="3" name="Text Placeholder 2"/>
-          <p:cNvSpPr>
-            <a:spLocks noGrp="1"/>
-          </p:cNvSpPr>
-          <p:nvPr>
-            <p:ph type="body" idx="1"/>
-          </p:nvPr>
-        </p:nvSpPr>
+      <p:pic>
+        <p:nvPicPr>
+          <p:cNvPr id="4" name="Content Placeholder 3" descr="Action Groups.jpg"/>
+          <p:cNvPicPr>
+            <a:picLocks noGrp="1" noChangeAspect="1"/>
+          </p:cNvPicPr>
+          <p:nvPr>
+            <p:ph idx="1"/>
+          </p:nvPr>
+        </p:nvPicPr>
+        <p:blipFill>
+          <a:blip r:embed="rId2">
+            <a:extLst>
+              <a:ext uri="{28A0092B-C50C-407E-A947-70E740481C1C}">
+                <a14:useLocalDpi xmlns:a14="http://schemas.microsoft.com/office/drawing/2010/main" val="0"/>
+              </a:ext>
+            </a:extLst>
+          </a:blip>
+          <a:srcRect t="-13480" b="-13480"/>
+          <a:stretch>
+            <a:fillRect/>
+          </a:stretch>
+        </p:blipFill>
         <p:spPr/>
-        <p:txBody>
-          <a:bodyPr>
-            <a:normAutofit/>
-          </a:bodyPr>
-          <a:lstStyle/>
-          <a:p>
-            <a:pPr lvl="1"/>
-            <a:r>
-              <a:rPr lang="en-US" sz="2800" dirty="0" smtClean="0"/>
-              <a:t> May ballot final content deadline is April 1</a:t>
-            </a:r>
-            <a:r>
-              <a:rPr lang="en-US" sz="2800" baseline="30000" dirty="0" smtClean="0"/>
-              <a:t>st</a:t>
-            </a:r>
-            <a:endParaRPr lang="en-US" sz="2800" dirty="0" smtClean="0"/>
-          </a:p>
-          <a:p>
-            <a:pPr lvl="1"/>
-            <a:r>
-              <a:rPr lang="en-US" sz="2800" dirty="0" smtClean="0"/>
-              <a:t> </a:t>
-            </a:r>
-            <a:r>
-              <a:rPr lang="en-US" sz="2800" dirty="0" err="1" smtClean="0"/>
-              <a:t>Workstreams</a:t>
-            </a:r>
-            <a:r>
-              <a:rPr lang="en-US" sz="2800" dirty="0" smtClean="0"/>
-              <a:t>:</a:t>
-            </a:r>
-          </a:p>
-          <a:p>
-            <a:pPr lvl="2"/>
-            <a:r>
-              <a:rPr lang="en-US" sz="2800" dirty="0" smtClean="0"/>
-              <a:t>Apply approved changes from STU comments</a:t>
-            </a:r>
-          </a:p>
-          <a:p>
-            <a:pPr lvl="2"/>
-            <a:r>
-              <a:rPr lang="en-US" sz="2800" dirty="0" smtClean="0"/>
-              <a:t>Extend </a:t>
-            </a:r>
-            <a:r>
-              <a:rPr lang="en-US" sz="2800" dirty="0" err="1" smtClean="0"/>
-              <a:t>HeD</a:t>
-            </a:r>
-            <a:r>
-              <a:rPr lang="en-US" sz="2800" dirty="0" smtClean="0"/>
-              <a:t> design to support composition</a:t>
-            </a:r>
-          </a:p>
-          <a:p>
-            <a:pPr lvl="2"/>
-            <a:r>
-              <a:rPr lang="en-US" sz="2800" dirty="0" smtClean="0"/>
-              <a:t>Prepare STU ballot for </a:t>
-            </a:r>
-            <a:r>
-              <a:rPr lang="en-US" sz="2800" dirty="0" err="1" smtClean="0"/>
-              <a:t>HeD</a:t>
-            </a:r>
-            <a:r>
-              <a:rPr lang="en-US" sz="2800" dirty="0" smtClean="0"/>
-              <a:t> KAS</a:t>
-            </a:r>
-          </a:p>
-          <a:p>
-            <a:pPr lvl="2"/>
-            <a:r>
-              <a:rPr lang="en-US" sz="2800" dirty="0" smtClean="0"/>
-              <a:t>Prepare ballot for conceptual model</a:t>
-            </a:r>
-          </a:p>
-          <a:p>
-            <a:pPr lvl="1"/>
-            <a:r>
-              <a:rPr lang="en-US" sz="2800" dirty="0" smtClean="0"/>
-              <a:t>Can we accomplish any of this in the next 7 weeks? </a:t>
-            </a:r>
-          </a:p>
-          <a:p>
-            <a:pPr marL="237744" lvl="2" indent="0">
-              <a:buNone/>
-            </a:pPr>
-            <a:r>
-              <a:rPr lang="en-US" sz="2800" dirty="0" smtClean="0"/>
-              <a:t>	</a:t>
-            </a:r>
-            <a:endParaRPr lang="en-US" sz="2800" dirty="0"/>
-          </a:p>
-        </p:txBody>
-      </p:sp>
+      </p:pic>
     </p:spTree>
     <p:extLst>
       <p:ext uri="{BB962C8B-B14F-4D97-AF65-F5344CB8AC3E}">
-        <p14:creationId xmlns:p14="http://schemas.microsoft.com/office/powerpoint/2010/main" val="2040674954"/>
+        <p14:creationId xmlns:p14="http://schemas.microsoft.com/office/powerpoint/2010/main" val="4196994705"/>
       </p:ext>
     </p:extLst>
   </p:cSld>
   <p:clrMapOvr>
     <a:masterClrMapping/>
   </p:clrMapOvr>
+  <p:timing>
+    <p:tnLst>
+      <p:par>
+        <p:cTn xmlns:p14="http://schemas.microsoft.com/office/powerpoint/2010/main" id="1" dur="indefinite" restart="never" nodeType="tmRoot"/>
+      </p:par>
+    </p:tnLst>
+  </p:timing>
 </p:sld>
 </file>
 
@@ -7258,29 +7594,76 @@
             <p:ph type="title"/>
           </p:nvPr>
         </p:nvSpPr>
+        <p:spPr/>
+        <p:txBody>
+          <a:bodyPr/>
+          <a:lstStyle/>
+          <a:p>
+            <a:r>
+              <a:rPr lang="en-US" dirty="0" err="1" smtClean="0"/>
+              <a:t>Fhir</a:t>
+            </a:r>
+            <a:r>
+              <a:rPr lang="en-US" dirty="0" smtClean="0"/>
+              <a:t> diagram</a:t>
+            </a:r>
+            <a:endParaRPr lang="en-US" dirty="0"/>
+          </a:p>
+        </p:txBody>
+      </p:sp>
+      <p:sp>
+        <p:nvSpPr>
+          <p:cNvPr id="3" name="Text Placeholder 2"/>
+          <p:cNvSpPr>
+            <a:spLocks noGrp="1"/>
+          </p:cNvSpPr>
+          <p:nvPr>
+            <p:ph type="body" idx="1"/>
+          </p:nvPr>
+        </p:nvSpPr>
+        <p:spPr/>
+        <p:txBody>
+          <a:bodyPr/>
+          <a:lstStyle/>
+          <a:p>
+            <a:endParaRPr lang="en-US" dirty="0" smtClean="0"/>
+          </a:p>
+        </p:txBody>
+      </p:sp>
+      <p:pic>
+        <p:nvPicPr>
+          <p:cNvPr id="4" name="Picture 3" descr="Knowledge Artifact Resources.jpg"/>
+          <p:cNvPicPr>
+            <a:picLocks noChangeAspect="1"/>
+          </p:cNvPicPr>
+          <p:nvPr/>
+        </p:nvPicPr>
+        <p:blipFill>
+          <a:blip r:embed="rId2">
+            <a:extLst>
+              <a:ext uri="{28A0092B-C50C-407E-A947-70E740481C1C}">
+                <a14:useLocalDpi xmlns:a14="http://schemas.microsoft.com/office/drawing/2010/main" val="0"/>
+              </a:ext>
+            </a:extLst>
+          </a:blip>
+          <a:stretch>
+            <a:fillRect/>
+          </a:stretch>
+        </p:blipFill>
         <p:spPr>
           <a:xfrm>
-            <a:off x="714541" y="2720172"/>
-            <a:ext cx="7726670" cy="548640"/>
+            <a:off x="876300" y="774700"/>
+            <a:ext cx="7391400" cy="5308600"/>
           </a:xfrm>
+          <a:prstGeom prst="rect">
+            <a:avLst/>
+          </a:prstGeom>
         </p:spPr>
-        <p:txBody>
-          <a:bodyPr/>
-          <a:lstStyle/>
-          <a:p>
-            <a:pPr algn="ctr"/>
-            <a:r>
-              <a:rPr lang="en-US" dirty="0" smtClean="0"/>
-              <a:t>Questions?</a:t>
-            </a:r>
-            <a:endParaRPr lang="en-US" dirty="0"/>
-          </a:p>
-        </p:txBody>
-      </p:sp>
+      </p:pic>
     </p:spTree>
     <p:extLst>
       <p:ext uri="{BB962C8B-B14F-4D97-AF65-F5344CB8AC3E}">
-        <p14:creationId xmlns:p14="http://schemas.microsoft.com/office/powerpoint/2010/main" val="3873101453"/>
+        <p14:creationId xmlns:p14="http://schemas.microsoft.com/office/powerpoint/2010/main" val="3132352188"/>
       </p:ext>
     </p:extLst>
   </p:cSld>

</xml_diff>